<commit_message>
small edits to REDCap presentation
</commit_message>
<xml_diff>
--- a/2014_Presentations/09_September/LiterateProgrammingPatternsAndPracticesWithREDCap.pptx
+++ b/2014_Presentations/09_September/LiterateProgrammingPatternsAndPracticesWithREDCap.pptx
@@ -5,7 +5,7 @@
     <p:sldMasterId id="2147483648" r:id="rId1"/>
   </p:sldMasterIdLst>
   <p:notesMasterIdLst>
-    <p:notesMasterId r:id="rId44"/>
+    <p:notesMasterId r:id="rId43"/>
   </p:notesMasterIdLst>
   <p:sldIdLst>
     <p:sldId id="256" r:id="rId2"/>
@@ -49,7 +49,6 @@
     <p:sldId id="320" r:id="rId40"/>
     <p:sldId id="288" r:id="rId41"/>
     <p:sldId id="314" r:id="rId42"/>
-    <p:sldId id="321" r:id="rId43"/>
   </p:sldIdLst>
   <p:sldSz cx="9144000" cy="6858000" type="screen4x3"/>
   <p:notesSz cx="6858000" cy="9144000"/>
@@ -261,7 +260,7 @@
           <a:p>
             <a:fld id="{02FEACE0-AA4E-40DC-B530-80B2AA242B25}" type="datetimeFigureOut">
               <a:rPr lang="en-US" smtClean="0"/>
-              <a:t>9/3/2014</a:t>
+              <a:t>9/1/2014</a:t>
             </a:fld>
             <a:endParaRPr lang="en-US"/>
           </a:p>
@@ -879,7 +878,7 @@
             <a:fld id="{1D8BD707-D9CF-40AE-B4C6-C98DA3205C09}" type="datetimeFigureOut">
               <a:rPr lang="en-US" smtClean="0"/>
               <a:pPr/>
-              <a:t>9/3/2014</a:t>
+              <a:t>9/1/2014</a:t>
             </a:fld>
             <a:endParaRPr lang="en-US"/>
           </a:p>
@@ -1046,7 +1045,7 @@
             <a:fld id="{1D8BD707-D9CF-40AE-B4C6-C98DA3205C09}" type="datetimeFigureOut">
               <a:rPr lang="en-US" smtClean="0"/>
               <a:pPr/>
-              <a:t>9/3/2014</a:t>
+              <a:t>9/1/2014</a:t>
             </a:fld>
             <a:endParaRPr lang="en-US"/>
           </a:p>
@@ -1223,7 +1222,7 @@
             <a:fld id="{1D8BD707-D9CF-40AE-B4C6-C98DA3205C09}" type="datetimeFigureOut">
               <a:rPr lang="en-US" smtClean="0"/>
               <a:pPr/>
-              <a:t>9/3/2014</a:t>
+              <a:t>9/1/2014</a:t>
             </a:fld>
             <a:endParaRPr lang="en-US"/>
           </a:p>
@@ -1390,7 +1389,7 @@
             <a:fld id="{1D8BD707-D9CF-40AE-B4C6-C98DA3205C09}" type="datetimeFigureOut">
               <a:rPr lang="en-US" smtClean="0"/>
               <a:pPr/>
-              <a:t>9/3/2014</a:t>
+              <a:t>9/1/2014</a:t>
             </a:fld>
             <a:endParaRPr lang="en-US"/>
           </a:p>
@@ -1633,7 +1632,7 @@
             <a:fld id="{1D8BD707-D9CF-40AE-B4C6-C98DA3205C09}" type="datetimeFigureOut">
               <a:rPr lang="en-US" smtClean="0"/>
               <a:pPr/>
-              <a:t>9/3/2014</a:t>
+              <a:t>9/1/2014</a:t>
             </a:fld>
             <a:endParaRPr lang="en-US"/>
           </a:p>
@@ -1918,7 +1917,7 @@
             <a:fld id="{1D8BD707-D9CF-40AE-B4C6-C98DA3205C09}" type="datetimeFigureOut">
               <a:rPr lang="en-US" smtClean="0"/>
               <a:pPr/>
-              <a:t>9/3/2014</a:t>
+              <a:t>9/1/2014</a:t>
             </a:fld>
             <a:endParaRPr lang="en-US"/>
           </a:p>
@@ -2337,7 +2336,7 @@
             <a:fld id="{1D8BD707-D9CF-40AE-B4C6-C98DA3205C09}" type="datetimeFigureOut">
               <a:rPr lang="en-US" smtClean="0"/>
               <a:pPr/>
-              <a:t>9/3/2014</a:t>
+              <a:t>9/1/2014</a:t>
             </a:fld>
             <a:endParaRPr lang="en-US"/>
           </a:p>
@@ -2452,7 +2451,7 @@
             <a:fld id="{1D8BD707-D9CF-40AE-B4C6-C98DA3205C09}" type="datetimeFigureOut">
               <a:rPr lang="en-US" smtClean="0"/>
               <a:pPr/>
-              <a:t>9/3/2014</a:t>
+              <a:t>9/1/2014</a:t>
             </a:fld>
             <a:endParaRPr lang="en-US"/>
           </a:p>
@@ -2544,7 +2543,7 @@
             <a:fld id="{1D8BD707-D9CF-40AE-B4C6-C98DA3205C09}" type="datetimeFigureOut">
               <a:rPr lang="en-US" smtClean="0"/>
               <a:pPr/>
-              <a:t>9/3/2014</a:t>
+              <a:t>9/1/2014</a:t>
             </a:fld>
             <a:endParaRPr lang="en-US"/>
           </a:p>
@@ -2818,7 +2817,7 @@
             <a:fld id="{1D8BD707-D9CF-40AE-B4C6-C98DA3205C09}" type="datetimeFigureOut">
               <a:rPr lang="en-US" smtClean="0"/>
               <a:pPr/>
-              <a:t>9/3/2014</a:t>
+              <a:t>9/1/2014</a:t>
             </a:fld>
             <a:endParaRPr lang="en-US"/>
           </a:p>
@@ -3068,7 +3067,7 @@
             <a:fld id="{1D8BD707-D9CF-40AE-B4C6-C98DA3205C09}" type="datetimeFigureOut">
               <a:rPr lang="en-US" smtClean="0"/>
               <a:pPr/>
-              <a:t>9/3/2014</a:t>
+              <a:t>9/1/2014</a:t>
             </a:fld>
             <a:endParaRPr lang="en-US"/>
           </a:p>
@@ -3278,7 +3277,7 @@
             <a:fld id="{1D8BD707-D9CF-40AE-B4C6-C98DA3205C09}" type="datetimeFigureOut">
               <a:rPr lang="en-US" smtClean="0"/>
               <a:pPr/>
-              <a:t>9/3/2014</a:t>
+              <a:t>9/1/2014</a:t>
             </a:fld>
             <a:endParaRPr lang="en-US"/>
           </a:p>
@@ -4433,21 +4432,34 @@
             </a:pPr>
             <a:r>
               <a:rPr lang="en-US" dirty="0" smtClean="0"/>
-              <a:t>A “token”, which is a hash that combines:</a:t>
-            </a:r>
+              <a:t>A “token”, which is a hash </a:t>
+            </a:r>
+            <a:r>
+              <a:rPr lang="en-US" dirty="0" smtClean="0"/>
+              <a:t>that combines:</a:t>
+            </a:r>
+            <a:endParaRPr lang="en-US" dirty="0" smtClean="0"/>
           </a:p>
           <a:p>
             <a:pPr lvl="1"/>
             <a:r>
               <a:rPr lang="en-US" dirty="0" smtClean="0"/>
-              <a:t>The specific REDCap project (within the REDCap server).</a:t>
+              <a:t>The </a:t>
+            </a:r>
+            <a:r>
+              <a:rPr lang="en-US" dirty="0" smtClean="0"/>
+              <a:t>specific REDCap project (within the REDCap server).</a:t>
             </a:r>
           </a:p>
           <a:p>
             <a:pPr lvl="1"/>
             <a:r>
               <a:rPr lang="en-US" dirty="0" smtClean="0"/>
-              <a:t>The specific user.</a:t>
+              <a:t>The </a:t>
+            </a:r>
+            <a:r>
+              <a:rPr lang="en-US" dirty="0" smtClean="0"/>
+              <a:t>specific user.</a:t>
             </a:r>
           </a:p>
           <a:p>
@@ -7120,6 +7132,12 @@
               </a:rPr>
               <a:t>ds</a:t>
             </a:r>
+            <a:endParaRPr lang="en-US" sz="1800" dirty="0" smtClean="0">
+              <a:solidFill>
+                <a:srgbClr val="000000"/>
+              </a:solidFill>
+              <a:latin typeface="Consolas"/>
+            </a:endParaRPr>
           </a:p>
         </p:txBody>
       </p:sp>
@@ -7462,7 +7480,11 @@
           <a:p>
             <a:r>
               <a:rPr lang="en-US" dirty="0" smtClean="0"/>
-              <a:t>There’s less coverage of </a:t>
+              <a:t>There’s </a:t>
+            </a:r>
+            <a:r>
+              <a:rPr lang="en-US" dirty="0" smtClean="0"/>
+              <a:t>less coverage of </a:t>
             </a:r>
             <a:r>
               <a:rPr lang="en-US" dirty="0" err="1" smtClean="0"/>
@@ -7470,7 +7492,11 @@
             </a:r>
             <a:r>
               <a:rPr lang="en-US" dirty="0" smtClean="0"/>
-              <a:t> strengths &amp; weaknesses.</a:t>
+              <a:t> strengths &amp; </a:t>
+            </a:r>
+            <a:r>
+              <a:rPr lang="en-US" dirty="0" smtClean="0"/>
+              <a:t>weaknesses.</a:t>
             </a:r>
           </a:p>
           <a:p>
@@ -7486,7 +7512,11 @@
             </a:br>
             <a:r>
               <a:rPr lang="en-US" dirty="0" smtClean="0"/>
-              <a:t>such as direct API calls or raw CSV export/imports.</a:t>
+              <a:t>such as direct API calls or raw CSV export/imports</a:t>
+            </a:r>
+            <a:r>
+              <a:rPr lang="en-US" dirty="0" smtClean="0"/>
+              <a:t>.</a:t>
             </a:r>
           </a:p>
           <a:p>
@@ -7495,7 +7525,11 @@
           <a:p>
             <a:r>
               <a:rPr lang="en-US" dirty="0" smtClean="0"/>
-              <a:t>More specifics about reporting.</a:t>
+              <a:t>More specifics about reporting</a:t>
+            </a:r>
+            <a:r>
+              <a:rPr lang="en-US" dirty="0" smtClean="0"/>
+              <a:t>.</a:t>
             </a:r>
           </a:p>
           <a:p>
@@ -9948,7 +9982,31 @@
             <a:pPr lvl="1"/>
             <a:r>
               <a:rPr lang="en-US" dirty="0" smtClean="0"/>
-              <a:t>Admins for SQL Server are the same for REDCap server, so the threat envelope isn’t larger.</a:t>
+              <a:t>Admins </a:t>
+            </a:r>
+            <a:r>
+              <a:rPr lang="en-US" dirty="0" smtClean="0"/>
+              <a:t>for SQL </a:t>
+            </a:r>
+            <a:r>
+              <a:rPr lang="en-US" dirty="0" smtClean="0"/>
+              <a:t>Server </a:t>
+            </a:r>
+            <a:r>
+              <a:rPr lang="en-US" dirty="0" smtClean="0"/>
+              <a:t>are the </a:t>
+            </a:r>
+            <a:r>
+              <a:rPr lang="en-US" dirty="0" smtClean="0"/>
+              <a:t>same </a:t>
+            </a:r>
+            <a:r>
+              <a:rPr lang="en-US" dirty="0" smtClean="0"/>
+              <a:t>for REDCap server</a:t>
+            </a:r>
+            <a:r>
+              <a:rPr lang="en-US" dirty="0" smtClean="0"/>
+              <a:t>, so the threat envelope isn’t larger.</a:t>
             </a:r>
           </a:p>
           <a:p>
@@ -9962,7 +10020,11 @@
             <a:pPr lvl="1"/>
             <a:r>
               <a:rPr lang="en-US" dirty="0" smtClean="0"/>
-              <a:t>Unfortunately, SQL Server and Windows AD discourage other </a:t>
+              <a:t>Unfortunately, SQL </a:t>
+            </a:r>
+            <a:r>
+              <a:rPr lang="en-US" dirty="0" smtClean="0"/>
+              <a:t>Server and Windows AD discourage other </a:t>
             </a:r>
             <a:r>
               <a:rPr lang="en-US" dirty="0" err="1" smtClean="0"/>
@@ -12749,6 +12811,7 @@
               <a:rPr lang="en-US" dirty="0" smtClean="0"/>
               <a:t>It is called by reports and sanitizers.</a:t>
             </a:r>
+            <a:endParaRPr lang="en-US" dirty="0" smtClean="0"/>
           </a:p>
           <a:p>
             <a:pPr lvl="1"/>
@@ -12799,7 +12862,11 @@
             <a:pPr lvl="1"/>
             <a:r>
               <a:rPr lang="en-US" dirty="0" smtClean="0"/>
-              <a:t>It is called by called by reports and other gateways.</a:t>
+              <a:t>It is called by called by reports and other gateways</a:t>
+            </a:r>
+            <a:r>
+              <a:rPr lang="en-US" dirty="0" smtClean="0"/>
+              <a:t>.</a:t>
             </a:r>
           </a:p>
         </p:txBody>
@@ -12986,7 +13053,11 @@
             </a:pPr>
             <a:r>
               <a:rPr lang="en-US" i="1" dirty="0" smtClean="0"/>
-              <a:t>¿Any recommendations for distinguishing names?</a:t>
+              <a:t>¿Any </a:t>
+            </a:r>
+            <a:r>
+              <a:rPr lang="en-US" i="1" dirty="0" smtClean="0"/>
+              <a:t>recommendations for distinguishing names?</a:t>
             </a:r>
             <a:endParaRPr lang="en-US" i="1" dirty="0"/>
           </a:p>
@@ -13362,6 +13433,7 @@
               <a:rPr lang="en-US" dirty="0"/>
               <a:t>Literate programming</a:t>
             </a:r>
+            <a:endParaRPr lang="en-US" dirty="0"/>
           </a:p>
         </p:txBody>
       </p:sp>
@@ -13747,173 +13819,6 @@
 </p:sld>
 </file>
 
-<file path=ppt/slides/slide42.xml><?xml version="1.0" encoding="utf-8"?>
-<p:sld xmlns:a="http://schemas.openxmlformats.org/drawingml/2006/main" xmlns:r="http://schemas.openxmlformats.org/officeDocument/2006/relationships" xmlns:p="http://schemas.openxmlformats.org/presentationml/2006/main">
-  <p:cSld>
-    <p:spTree>
-      <p:nvGrpSpPr>
-        <p:cNvPr id="1" name=""/>
-        <p:cNvGrpSpPr/>
-        <p:nvPr/>
-      </p:nvGrpSpPr>
-      <p:grpSpPr>
-        <a:xfrm>
-          <a:off x="0" y="0"/>
-          <a:ext cx="0" cy="0"/>
-          <a:chOff x="0" y="0"/>
-          <a:chExt cx="0" cy="0"/>
-        </a:xfrm>
-      </p:grpSpPr>
-      <p:sp>
-        <p:nvSpPr>
-          <p:cNvPr id="2" name="Title 1"/>
-          <p:cNvSpPr>
-            <a:spLocks noGrp="1"/>
-          </p:cNvSpPr>
-          <p:nvPr>
-            <p:ph type="title"/>
-          </p:nvPr>
-        </p:nvSpPr>
-        <p:spPr>
-          <a:xfrm>
-            <a:off x="76200" y="76200"/>
-            <a:ext cx="8991600" cy="762000"/>
-          </a:xfrm>
-          <a:solidFill>
-            <a:schemeClr val="bg1">
-              <a:lumMod val="85000"/>
-            </a:schemeClr>
-          </a:solidFill>
-        </p:spPr>
-        <p:txBody>
-          <a:bodyPr>
-            <a:normAutofit fontScale="90000"/>
-          </a:bodyPr>
-          <a:lstStyle/>
-          <a:p>
-            <a:pPr marL="0" indent="0"/>
-            <a:r>
-              <a:rPr lang="en-US" sz="4900" dirty="0" smtClean="0"/>
-              <a:t>Thanks to Funders</a:t>
-            </a:r>
-            <a:endParaRPr lang="en-US" dirty="0"/>
-          </a:p>
-        </p:txBody>
-      </p:sp>
-      <p:sp>
-        <p:nvSpPr>
-          <p:cNvPr id="3" name="Content Placeholder 2"/>
-          <p:cNvSpPr>
-            <a:spLocks noGrp="1"/>
-          </p:cNvSpPr>
-          <p:nvPr>
-            <p:ph idx="1"/>
-          </p:nvPr>
-        </p:nvSpPr>
-        <p:spPr>
-          <a:xfrm>
-            <a:off x="0" y="838200"/>
-            <a:ext cx="9144000" cy="6019800"/>
-          </a:xfrm>
-        </p:spPr>
-        <p:txBody>
-          <a:bodyPr>
-            <a:normAutofit/>
-          </a:bodyPr>
-          <a:lstStyle/>
-          <a:p>
-            <a:pPr marL="0" indent="0" algn="ctr">
-              <a:buNone/>
-            </a:pPr>
-            <a:endParaRPr lang="en-US" sz="2400" dirty="0" smtClean="0"/>
-          </a:p>
-          <a:p>
-            <a:pPr marL="0" indent="0" algn="ctr">
-              <a:buNone/>
-            </a:pPr>
-            <a:endParaRPr lang="en-US" sz="2400"/>
-          </a:p>
-          <a:p>
-            <a:pPr marL="0" indent="0" algn="ctr">
-              <a:buNone/>
-            </a:pPr>
-            <a:r>
-              <a:rPr lang="en-US" sz="2400" smtClean="0"/>
-              <a:t>HRSA/ACF </a:t>
-            </a:r>
-            <a:r>
-              <a:rPr lang="en-US" sz="2400" dirty="0" smtClean="0"/>
-              <a:t>D89MC23154</a:t>
-            </a:r>
-            <a:endParaRPr lang="en-US" sz="2400" dirty="0"/>
-          </a:p>
-          <a:p>
-            <a:pPr marL="0" indent="0" algn="ctr">
-              <a:buNone/>
-            </a:pPr>
-            <a:endParaRPr lang="en-US" sz="2400" dirty="0" smtClean="0"/>
-          </a:p>
-          <a:p>
-            <a:pPr marL="0" indent="0" algn="ctr">
-              <a:buNone/>
-            </a:pPr>
-            <a:r>
-              <a:rPr lang="en-US" sz="2400" dirty="0" smtClean="0"/>
-              <a:t>OUHSC </a:t>
-            </a:r>
-            <a:r>
-              <a:rPr lang="en-US" sz="2400" dirty="0"/>
-              <a:t>CCAN Independent Evaluation of the State of Oklahoma Competitive Maternal, Infant, and Early Childhood Home Visiting (MIECHV) Project. </a:t>
-            </a:r>
-            <a:endParaRPr lang="en-US" sz="2400" dirty="0" smtClean="0"/>
-          </a:p>
-          <a:p>
-            <a:pPr marL="0" indent="0" algn="ctr">
-              <a:buNone/>
-            </a:pPr>
-            <a:endParaRPr lang="en-US" sz="2400" dirty="0" smtClean="0"/>
-          </a:p>
-          <a:p>
-            <a:pPr marL="0" indent="0" algn="ctr">
-              <a:buNone/>
-            </a:pPr>
-            <a:r>
-              <a:rPr lang="en-US" sz="2400" dirty="0" smtClean="0"/>
-              <a:t>Evaluates </a:t>
-            </a:r>
-            <a:r>
-              <a:rPr lang="en-US" sz="2400" dirty="0"/>
-              <a:t>MIECHV expansion and enhancement of Evidence-based Home Visitation programs in four Oklahoma counties.  </a:t>
-            </a:r>
-          </a:p>
-          <a:p>
-            <a:pPr marL="0" indent="0">
-              <a:buNone/>
-            </a:pPr>
-            <a:endParaRPr lang="en-US" dirty="0"/>
-          </a:p>
-        </p:txBody>
-      </p:sp>
-    </p:spTree>
-    <p:extLst>
-      <p:ext uri="{BB962C8B-B14F-4D97-AF65-F5344CB8AC3E}">
-        <p14:creationId xmlns:p14="http://schemas.microsoft.com/office/powerpoint/2010/main" val="1581996257"/>
-      </p:ext>
-    </p:extLst>
-  </p:cSld>
-  <p:clrMapOvr>
-    <a:masterClrMapping/>
-  </p:clrMapOvr>
-  <p:timing>
-    <p:tnLst>
-      <p:par>
-        <p:cTn id="1" dur="indefinite" restart="never" nodeType="tmRoot"/>
-      </p:par>
-    </p:tnLst>
-  </p:timing>
-</p:sld>
-</file>
-
 <file path=ppt/slides/slide5.xml><?xml version="1.0" encoding="utf-8"?>
 <p:sld xmlns:a="http://schemas.openxmlformats.org/drawingml/2006/main" xmlns:r="http://schemas.openxmlformats.org/officeDocument/2006/relationships" xmlns:p="http://schemas.openxmlformats.org/presentationml/2006/main">
   <p:cSld>
@@ -14322,7 +14227,15 @@
             <a:pPr lvl="1"/>
             <a:r>
               <a:rPr lang="en-US" dirty="0" smtClean="0"/>
-              <a:t>Developed by informatics core at Vanderbilt with support from NCRR and NIH, and designed for academic biomedical researchers.</a:t>
+              <a:t>Developed by informatics core at Vanderbilt with support from NCRR and </a:t>
+            </a:r>
+            <a:r>
+              <a:rPr lang="en-US" dirty="0" smtClean="0"/>
+              <a:t>NIH, and designed </a:t>
+            </a:r>
+            <a:r>
+              <a:rPr lang="en-US" dirty="0" smtClean="0"/>
+              <a:t>for academic biomedical researchers.</a:t>
             </a:r>
           </a:p>
           <a:p>
@@ -14342,7 +14255,11 @@
             <a:pPr lvl="1"/>
             <a:r>
               <a:rPr lang="en-US" dirty="0" smtClean="0"/>
-              <a:t>A centralized, back-end storage component</a:t>
+              <a:t>A </a:t>
+            </a:r>
+            <a:r>
+              <a:rPr lang="en-US" dirty="0" smtClean="0"/>
+              <a:t>centralized, back-end storage component</a:t>
             </a:r>
             <a:r>
               <a:rPr lang="en-US" dirty="0"/>

</xml_diff>